<commit_message>
incluir pdf presentacion aplicacion
</commit_message>
<xml_diff>
--- a/presentacion proyecto/Aplicación Perritos Chile.pptx
+++ b/presentacion proyecto/Aplicación Perritos Chile.pptx
@@ -10,6 +10,10 @@
     <p:sldId id="258" r:id="rId4"/>
     <p:sldId id="259" r:id="rId5"/>
     <p:sldId id="260" r:id="rId6"/>
+    <p:sldId id="261" r:id="rId7"/>
+    <p:sldId id="262" r:id="rId8"/>
+    <p:sldId id="263" r:id="rId9"/>
+    <p:sldId id="264" r:id="rId10"/>
   </p:sldIdLst>
   <p:sldSz cx="12192000" cy="6858000"/>
   <p:notesSz cx="6858000" cy="9144000"/>
@@ -108,6 +112,11 @@
       </a:defRPr>
     </a:lvl9pPr>
   </p:defaultTextStyle>
+  <p:extLst>
+    <p:ext uri="{EFAFB233-063F-42B5-8137-9DF3F51BA10A}">
+      <p15:sldGuideLst xmlns:p15="http://schemas.microsoft.com/office/powerpoint/2012/main"/>
+    </p:ext>
+  </p:extLst>
 </p:presentation>
 </file>
 
@@ -4331,7 +4340,7 @@
         </p:nvSpPr>
         <p:spPr>
           <a:xfrm>
-            <a:off x="3286538" y="3154982"/>
+            <a:off x="3286538" y="2885298"/>
             <a:ext cx="3127972" cy="3416320"/>
           </a:xfrm>
           <a:prstGeom prst="rect">
@@ -4389,7 +4398,7 @@
           <a:p>
             <a:r>
               <a:rPr lang="es-MX" dirty="0"/>
-              <a:t>varios errores posterior a la </a:t>
+              <a:t>errores posterior a la </a:t>
             </a:r>
           </a:p>
           <a:p>
@@ -4970,7 +4979,7 @@
           <p:cNvPr id="2" name="Título 1">
             <a:extLst>
               <a:ext uri="{FF2B5EF4-FFF2-40B4-BE49-F238E27FC236}">
-                <a16:creationId xmlns:a16="http://schemas.microsoft.com/office/drawing/2014/main" id="{C60F209A-BB75-4CBB-B36D-01F970F421CA}"/>
+                <a16:creationId xmlns:a16="http://schemas.microsoft.com/office/drawing/2014/main" id="{4DA5F721-3DC5-4B78-9AE9-321005E18D10}"/>
               </a:ext>
             </a:extLst>
           </p:cNvPr>
@@ -4986,39 +4995,1424 @@
           <a:bodyPr/>
           <a:lstStyle/>
           <a:p>
-            <a:endParaRPr lang="es-CL"/>
-          </a:p>
-        </p:txBody>
-      </p:sp>
-      <p:sp>
-        <p:nvSpPr>
-          <p:cNvPr id="3" name="Marcador de contenido 2">
+            <a:r>
+              <a:rPr lang="es-MX" dirty="0"/>
+              <a:t>Fragmento inicio</a:t>
+            </a:r>
+            <a:endParaRPr lang="es-CL" dirty="0"/>
+          </a:p>
+        </p:txBody>
+      </p:sp>
+      <p:sp>
+        <p:nvSpPr>
+          <p:cNvPr id="8" name="CuadroTexto 7">
             <a:extLst>
               <a:ext uri="{FF2B5EF4-FFF2-40B4-BE49-F238E27FC236}">
-                <a16:creationId xmlns:a16="http://schemas.microsoft.com/office/drawing/2014/main" id="{3344C3CF-7D43-47F0-B502-061547FF062C}"/>
+                <a16:creationId xmlns:a16="http://schemas.microsoft.com/office/drawing/2014/main" id="{11B120FC-47F7-4B85-BB93-3868C7DF87D0}"/>
               </a:ext>
             </a:extLst>
           </p:cNvPr>
-          <p:cNvSpPr>
-            <a:spLocks noGrp="1"/>
-          </p:cNvSpPr>
-          <p:nvPr>
-            <p:ph idx="1"/>
-          </p:nvPr>
-        </p:nvSpPr>
-        <p:spPr/>
-        <p:txBody>
-          <a:bodyPr/>
-          <a:lstStyle/>
-          <a:p>
-            <a:endParaRPr lang="es-CL"/>
+          <p:cNvSpPr txBox="1"/>
+          <p:nvPr/>
+        </p:nvSpPr>
+        <p:spPr>
+          <a:xfrm>
+            <a:off x="2809542" y="2205333"/>
+            <a:ext cx="1744388" cy="369332"/>
+          </a:xfrm>
+          <a:prstGeom prst="rect">
+            <a:avLst/>
+          </a:prstGeom>
+          <a:noFill/>
+        </p:spPr>
+        <p:txBody>
+          <a:bodyPr wrap="none" rtlCol="0">
+            <a:spAutoFit/>
+          </a:bodyPr>
+          <a:lstStyle/>
+          <a:p>
+            <a:r>
+              <a:rPr lang="es-MX" dirty="0"/>
+              <a:t>Pantalla principal</a:t>
+            </a:r>
+          </a:p>
+        </p:txBody>
+      </p:sp>
+      <p:pic>
+        <p:nvPicPr>
+          <p:cNvPr id="9" name="Imagen 8">
+            <a:extLst>
+              <a:ext uri="{FF2B5EF4-FFF2-40B4-BE49-F238E27FC236}">
+                <a16:creationId xmlns:a16="http://schemas.microsoft.com/office/drawing/2014/main" id="{EC79FD38-9EBD-41A2-931A-9F58BAA32846}"/>
+              </a:ext>
+            </a:extLst>
+          </p:cNvPr>
+          <p:cNvPicPr>
+            <a:picLocks noChangeAspect="1"/>
+          </p:cNvPicPr>
+          <p:nvPr/>
+        </p:nvPicPr>
+        <p:blipFill>
+          <a:blip r:embed="rId2"/>
+          <a:srcRect/>
+          <a:stretch/>
+        </p:blipFill>
+        <p:spPr>
+          <a:xfrm>
+            <a:off x="687291" y="2205334"/>
+            <a:ext cx="2122251" cy="4480307"/>
+          </a:xfrm>
+          <a:prstGeom prst="rect">
+            <a:avLst/>
+          </a:prstGeom>
+        </p:spPr>
+      </p:pic>
+      <p:pic>
+        <p:nvPicPr>
+          <p:cNvPr id="12" name="Imagen 11">
+            <a:extLst>
+              <a:ext uri="{FF2B5EF4-FFF2-40B4-BE49-F238E27FC236}">
+                <a16:creationId xmlns:a16="http://schemas.microsoft.com/office/drawing/2014/main" id="{CA815CB5-1828-47D5-93EB-452E90019D86}"/>
+              </a:ext>
+            </a:extLst>
+          </p:cNvPr>
+          <p:cNvPicPr>
+            <a:picLocks noChangeAspect="1"/>
+          </p:cNvPicPr>
+          <p:nvPr/>
+        </p:nvPicPr>
+        <p:blipFill>
+          <a:blip r:embed="rId3"/>
+          <a:srcRect/>
+          <a:stretch/>
+        </p:blipFill>
+        <p:spPr>
+          <a:xfrm>
+            <a:off x="6698101" y="2205334"/>
+            <a:ext cx="2122251" cy="4480307"/>
+          </a:xfrm>
+          <a:prstGeom prst="rect">
+            <a:avLst/>
+          </a:prstGeom>
+        </p:spPr>
+      </p:pic>
+      <p:sp>
+        <p:nvSpPr>
+          <p:cNvPr id="17" name="CuadroTexto 16">
+            <a:extLst>
+              <a:ext uri="{FF2B5EF4-FFF2-40B4-BE49-F238E27FC236}">
+                <a16:creationId xmlns:a16="http://schemas.microsoft.com/office/drawing/2014/main" id="{0C77E972-EC2E-44CB-8586-48283A6F4AAB}"/>
+              </a:ext>
+            </a:extLst>
+          </p:cNvPr>
+          <p:cNvSpPr txBox="1"/>
+          <p:nvPr/>
+        </p:nvSpPr>
+        <p:spPr>
+          <a:xfrm>
+            <a:off x="8938672" y="1904574"/>
+            <a:ext cx="2372124" cy="646331"/>
+          </a:xfrm>
+          <a:prstGeom prst="rect">
+            <a:avLst/>
+          </a:prstGeom>
+          <a:noFill/>
+        </p:spPr>
+        <p:txBody>
+          <a:bodyPr wrap="none" rtlCol="0">
+            <a:spAutoFit/>
+          </a:bodyPr>
+          <a:lstStyle/>
+          <a:p>
+            <a:r>
+              <a:rPr lang="es-MX" dirty="0"/>
+              <a:t>Publicaciones con fotos</a:t>
+            </a:r>
+          </a:p>
+          <a:p>
+            <a:r>
+              <a:rPr lang="es-MX" dirty="0"/>
+              <a:t>Predeterminadas</a:t>
+            </a:r>
+          </a:p>
+        </p:txBody>
+      </p:sp>
+      <p:sp>
+        <p:nvSpPr>
+          <p:cNvPr id="19" name="CuadroTexto 18">
+            <a:extLst>
+              <a:ext uri="{FF2B5EF4-FFF2-40B4-BE49-F238E27FC236}">
+                <a16:creationId xmlns:a16="http://schemas.microsoft.com/office/drawing/2014/main" id="{EFCCD98E-F07E-4748-B1CA-D444220DCA09}"/>
+              </a:ext>
+            </a:extLst>
+          </p:cNvPr>
+          <p:cNvSpPr txBox="1"/>
+          <p:nvPr/>
+        </p:nvSpPr>
+        <p:spPr>
+          <a:xfrm>
+            <a:off x="2809542" y="2739524"/>
+            <a:ext cx="2797561" cy="3970318"/>
+          </a:xfrm>
+          <a:prstGeom prst="rect">
+            <a:avLst/>
+          </a:prstGeom>
+          <a:noFill/>
+        </p:spPr>
+        <p:txBody>
+          <a:bodyPr wrap="none" rtlCol="0">
+            <a:spAutoFit/>
+          </a:bodyPr>
+          <a:lstStyle/>
+          <a:p>
+            <a:r>
+              <a:rPr lang="es-MX" dirty="0"/>
+              <a:t>En este fragmento es el</a:t>
+            </a:r>
+          </a:p>
+          <a:p>
+            <a:r>
+              <a:rPr lang="es-MX" dirty="0"/>
+              <a:t>que se muestra inicialmente</a:t>
+            </a:r>
+          </a:p>
+          <a:p>
+            <a:r>
+              <a:rPr lang="es-MX" dirty="0"/>
+              <a:t>cuando inicias sesión.</a:t>
+            </a:r>
+          </a:p>
+          <a:p>
+            <a:endParaRPr lang="es-MX" dirty="0"/>
+          </a:p>
+          <a:p>
+            <a:r>
+              <a:rPr lang="es-MX" dirty="0"/>
+              <a:t>Este es un </a:t>
+            </a:r>
+            <a:r>
+              <a:rPr lang="es-MX" dirty="0" err="1"/>
+              <a:t>RecyclerView</a:t>
+            </a:r>
+            <a:endParaRPr lang="es-MX" dirty="0"/>
+          </a:p>
+          <a:p>
+            <a:r>
+              <a:rPr lang="es-MX" dirty="0"/>
+              <a:t>con los avistamientos de</a:t>
+            </a:r>
+          </a:p>
+          <a:p>
+            <a:r>
+              <a:rPr lang="es-MX" dirty="0"/>
+              <a:t>perritos callejeros en </a:t>
+            </a:r>
+          </a:p>
+          <a:p>
+            <a:r>
+              <a:rPr lang="es-MX" dirty="0"/>
+              <a:t>problemas. El modo de </a:t>
+            </a:r>
+          </a:p>
+          <a:p>
+            <a:r>
+              <a:rPr lang="es-MX" dirty="0"/>
+              <a:t>carga es el mas reciente</a:t>
+            </a:r>
+          </a:p>
+          <a:p>
+            <a:r>
+              <a:rPr lang="es-MX" dirty="0"/>
+              <a:t>queda en primera posición.</a:t>
+            </a:r>
+          </a:p>
+          <a:p>
+            <a:endParaRPr lang="es-MX" dirty="0"/>
+          </a:p>
+          <a:p>
+            <a:r>
+              <a:rPr lang="es-MX" dirty="0"/>
+              <a:t>Es opcional tener una foto</a:t>
+            </a:r>
+          </a:p>
+          <a:p>
+            <a:r>
+              <a:rPr lang="es-MX" dirty="0"/>
+              <a:t>de perfil usuario así como</a:t>
+            </a:r>
+          </a:p>
+          <a:p>
+            <a:r>
+              <a:rPr lang="es-MX" dirty="0"/>
+              <a:t>la imagen del perrito.</a:t>
+            </a:r>
+          </a:p>
+        </p:txBody>
+      </p:sp>
+      <p:sp>
+        <p:nvSpPr>
+          <p:cNvPr id="23" name="CuadroTexto 22">
+            <a:extLst>
+              <a:ext uri="{FF2B5EF4-FFF2-40B4-BE49-F238E27FC236}">
+                <a16:creationId xmlns:a16="http://schemas.microsoft.com/office/drawing/2014/main" id="{74B30DC8-780D-411B-A3A2-DAE1F81A5ECF}"/>
+              </a:ext>
+            </a:extLst>
+          </p:cNvPr>
+          <p:cNvSpPr txBox="1"/>
+          <p:nvPr/>
+        </p:nvSpPr>
+        <p:spPr>
+          <a:xfrm>
+            <a:off x="8938672" y="2846548"/>
+            <a:ext cx="3251211" cy="4247317"/>
+          </a:xfrm>
+          <a:prstGeom prst="rect">
+            <a:avLst/>
+          </a:prstGeom>
+          <a:noFill/>
+        </p:spPr>
+        <p:txBody>
+          <a:bodyPr wrap="none" rtlCol="0">
+            <a:spAutoFit/>
+          </a:bodyPr>
+          <a:lstStyle/>
+          <a:p>
+            <a:r>
+              <a:rPr lang="es-MX" dirty="0"/>
+              <a:t>Tanto la imagen de la publicación</a:t>
+            </a:r>
+          </a:p>
+          <a:p>
+            <a:r>
+              <a:rPr lang="es-MX" dirty="0"/>
+              <a:t>como la foto de perfil del </a:t>
+            </a:r>
+          </a:p>
+          <a:p>
+            <a:r>
+              <a:rPr lang="es-MX" dirty="0"/>
+              <a:t>usuario no son exigencias,</a:t>
+            </a:r>
+          </a:p>
+          <a:p>
+            <a:r>
+              <a:rPr lang="es-MX" dirty="0"/>
+              <a:t>aunque preferente seria el </a:t>
+            </a:r>
+          </a:p>
+          <a:p>
+            <a:r>
+              <a:rPr lang="es-MX" dirty="0"/>
+              <a:t>Ideal cargarlas.</a:t>
+            </a:r>
+          </a:p>
+          <a:p>
+            <a:endParaRPr lang="es-MX" dirty="0"/>
+          </a:p>
+          <a:p>
+            <a:r>
+              <a:rPr lang="es-MX" dirty="0"/>
+              <a:t>En el primer aviso se ve que no </a:t>
+            </a:r>
+          </a:p>
+          <a:p>
+            <a:r>
+              <a:rPr lang="es-MX" dirty="0"/>
+              <a:t>se cargo una imagen para el </a:t>
+            </a:r>
+          </a:p>
+          <a:p>
+            <a:r>
+              <a:rPr lang="es-MX" dirty="0"/>
+              <a:t>aviso y cargo la predeterminada.</a:t>
+            </a:r>
+          </a:p>
+          <a:p>
+            <a:endParaRPr lang="es-MX" dirty="0"/>
+          </a:p>
+          <a:p>
+            <a:r>
+              <a:rPr lang="es-MX" dirty="0"/>
+              <a:t>En el segundo aviso, se puede </a:t>
+            </a:r>
+          </a:p>
+          <a:p>
+            <a:r>
+              <a:rPr lang="es-MX" dirty="0"/>
+              <a:t>ver que en el </a:t>
+            </a:r>
+            <a:r>
+              <a:rPr lang="es-MX" dirty="0" err="1"/>
+              <a:t>cardView</a:t>
+            </a:r>
+            <a:r>
+              <a:rPr lang="es-MX" dirty="0"/>
+              <a:t> que </a:t>
+            </a:r>
+          </a:p>
+          <a:p>
+            <a:r>
+              <a:rPr lang="es-MX" dirty="0"/>
+              <a:t>contiene la foto de perfil, esta </a:t>
+            </a:r>
+          </a:p>
+          <a:p>
+            <a:r>
+              <a:rPr lang="es-MX" dirty="0"/>
+              <a:t>carga la imagen predeterminada.</a:t>
+            </a:r>
+          </a:p>
+          <a:p>
+            <a:endParaRPr lang="es-MX" dirty="0"/>
           </a:p>
         </p:txBody>
       </p:sp>
     </p:spTree>
     <p:extLst>
       <p:ext uri="{BB962C8B-B14F-4D97-AF65-F5344CB8AC3E}">
-        <p14:creationId xmlns:p14="http://schemas.microsoft.com/office/powerpoint/2010/main" val="1854630493"/>
+        <p14:creationId xmlns:p14="http://schemas.microsoft.com/office/powerpoint/2010/main" val="962520256"/>
+      </p:ext>
+    </p:extLst>
+  </p:cSld>
+  <p:clrMapOvr>
+    <a:masterClrMapping/>
+  </p:clrMapOvr>
+</p:sld>
+</file>
+
+<file path=ppt/slides/slide6.xml><?xml version="1.0" encoding="utf-8"?>
+<p:sld xmlns:a="http://schemas.openxmlformats.org/drawingml/2006/main" xmlns:r="http://schemas.openxmlformats.org/officeDocument/2006/relationships" xmlns:p="http://schemas.openxmlformats.org/presentationml/2006/main">
+  <p:cSld>
+    <p:spTree>
+      <p:nvGrpSpPr>
+        <p:cNvPr id="1" name=""/>
+        <p:cNvGrpSpPr/>
+        <p:nvPr/>
+      </p:nvGrpSpPr>
+      <p:grpSpPr>
+        <a:xfrm>
+          <a:off x="0" y="0"/>
+          <a:ext cx="0" cy="0"/>
+          <a:chOff x="0" y="0"/>
+          <a:chExt cx="0" cy="0"/>
+        </a:xfrm>
+      </p:grpSpPr>
+      <p:sp>
+        <p:nvSpPr>
+          <p:cNvPr id="2" name="Título 1">
+            <a:extLst>
+              <a:ext uri="{FF2B5EF4-FFF2-40B4-BE49-F238E27FC236}">
+                <a16:creationId xmlns:a16="http://schemas.microsoft.com/office/drawing/2014/main" id="{4DA5F721-3DC5-4B78-9AE9-321005E18D10}"/>
+              </a:ext>
+            </a:extLst>
+          </p:cNvPr>
+          <p:cNvSpPr>
+            <a:spLocks noGrp="1"/>
+          </p:cNvSpPr>
+          <p:nvPr>
+            <p:ph type="title"/>
+          </p:nvPr>
+        </p:nvSpPr>
+        <p:spPr/>
+        <p:txBody>
+          <a:bodyPr/>
+          <a:lstStyle/>
+          <a:p>
+            <a:r>
+              <a:rPr lang="es-MX" dirty="0" err="1"/>
+              <a:t>Menu</a:t>
+            </a:r>
+            <a:r>
+              <a:rPr lang="es-MX" dirty="0"/>
+              <a:t> </a:t>
+            </a:r>
+            <a:r>
+              <a:rPr lang="es-MX" dirty="0" err="1"/>
+              <a:t>sandwich</a:t>
+            </a:r>
+            <a:endParaRPr lang="es-CL" dirty="0"/>
+          </a:p>
+        </p:txBody>
+      </p:sp>
+      <p:sp>
+        <p:nvSpPr>
+          <p:cNvPr id="8" name="CuadroTexto 7">
+            <a:extLst>
+              <a:ext uri="{FF2B5EF4-FFF2-40B4-BE49-F238E27FC236}">
+                <a16:creationId xmlns:a16="http://schemas.microsoft.com/office/drawing/2014/main" id="{11B120FC-47F7-4B85-BB93-3868C7DF87D0}"/>
+              </a:ext>
+            </a:extLst>
+          </p:cNvPr>
+          <p:cNvSpPr txBox="1"/>
+          <p:nvPr/>
+        </p:nvSpPr>
+        <p:spPr>
+          <a:xfrm>
+            <a:off x="6095999" y="2205334"/>
+            <a:ext cx="1640193" cy="369332"/>
+          </a:xfrm>
+          <a:prstGeom prst="rect">
+            <a:avLst/>
+          </a:prstGeom>
+          <a:noFill/>
+        </p:spPr>
+        <p:txBody>
+          <a:bodyPr wrap="none" rtlCol="0">
+            <a:spAutoFit/>
+          </a:bodyPr>
+          <a:lstStyle/>
+          <a:p>
+            <a:r>
+              <a:rPr lang="es-MX" dirty="0"/>
+              <a:t>Menú </a:t>
+            </a:r>
+            <a:r>
+              <a:rPr lang="es-MX" dirty="0" err="1"/>
+              <a:t>Sandwich</a:t>
+            </a:r>
+            <a:endParaRPr lang="es-MX" dirty="0"/>
+          </a:p>
+        </p:txBody>
+      </p:sp>
+      <p:pic>
+        <p:nvPicPr>
+          <p:cNvPr id="9" name="Imagen 8">
+            <a:extLst>
+              <a:ext uri="{FF2B5EF4-FFF2-40B4-BE49-F238E27FC236}">
+                <a16:creationId xmlns:a16="http://schemas.microsoft.com/office/drawing/2014/main" id="{EC79FD38-9EBD-41A2-931A-9F58BAA32846}"/>
+              </a:ext>
+            </a:extLst>
+          </p:cNvPr>
+          <p:cNvPicPr>
+            <a:picLocks noChangeAspect="1"/>
+          </p:cNvPicPr>
+          <p:nvPr/>
+        </p:nvPicPr>
+        <p:blipFill>
+          <a:blip r:embed="rId2"/>
+          <a:srcRect/>
+          <a:stretch/>
+        </p:blipFill>
+        <p:spPr>
+          <a:xfrm>
+            <a:off x="3244960" y="2205334"/>
+            <a:ext cx="2122251" cy="4480307"/>
+          </a:xfrm>
+          <a:prstGeom prst="rect">
+            <a:avLst/>
+          </a:prstGeom>
+        </p:spPr>
+      </p:pic>
+      <p:sp>
+        <p:nvSpPr>
+          <p:cNvPr id="19" name="CuadroTexto 18">
+            <a:extLst>
+              <a:ext uri="{FF2B5EF4-FFF2-40B4-BE49-F238E27FC236}">
+                <a16:creationId xmlns:a16="http://schemas.microsoft.com/office/drawing/2014/main" id="{EFCCD98E-F07E-4748-B1CA-D444220DCA09}"/>
+              </a:ext>
+            </a:extLst>
+          </p:cNvPr>
+          <p:cNvSpPr txBox="1"/>
+          <p:nvPr/>
+        </p:nvSpPr>
+        <p:spPr>
+          <a:xfrm>
+            <a:off x="6095999" y="2594752"/>
+            <a:ext cx="2888975" cy="3416320"/>
+          </a:xfrm>
+          <a:prstGeom prst="rect">
+            <a:avLst/>
+          </a:prstGeom>
+          <a:noFill/>
+        </p:spPr>
+        <p:txBody>
+          <a:bodyPr wrap="square" rtlCol="0">
+            <a:spAutoFit/>
+          </a:bodyPr>
+          <a:lstStyle/>
+          <a:p>
+            <a:r>
+              <a:rPr lang="es-MX" dirty="0"/>
+              <a:t>Este menú desplegable es </a:t>
+            </a:r>
+          </a:p>
+          <a:p>
+            <a:r>
+              <a:rPr lang="es-MX" dirty="0"/>
+              <a:t>una opción que tiene</a:t>
+            </a:r>
+          </a:p>
+          <a:p>
+            <a:r>
+              <a:rPr lang="es-MX" dirty="0"/>
+              <a:t>Android y sirve para </a:t>
+            </a:r>
+          </a:p>
+          <a:p>
+            <a:r>
+              <a:rPr lang="es-MX" dirty="0"/>
+              <a:t>poder navegar al fragmento</a:t>
+            </a:r>
+          </a:p>
+          <a:p>
+            <a:r>
+              <a:rPr lang="es-MX" dirty="0"/>
+              <a:t>que el usuario estime </a:t>
+            </a:r>
+          </a:p>
+          <a:p>
+            <a:r>
+              <a:rPr lang="es-MX" dirty="0"/>
+              <a:t>conveniente.</a:t>
+            </a:r>
+          </a:p>
+          <a:p>
+            <a:endParaRPr lang="es-MX" dirty="0"/>
+          </a:p>
+          <a:p>
+            <a:r>
+              <a:rPr lang="es-MX" dirty="0"/>
+              <a:t>En esta aplicación se </a:t>
+            </a:r>
+          </a:p>
+          <a:p>
+            <a:r>
+              <a:rPr lang="es-MX" dirty="0"/>
+              <a:t>mostrarán las opciones</a:t>
+            </a:r>
+          </a:p>
+          <a:p>
+            <a:r>
+              <a:rPr lang="es-MX" dirty="0"/>
+              <a:t>para navegar entre el </a:t>
+            </a:r>
+          </a:p>
+          <a:p>
+            <a:r>
+              <a:rPr lang="es-MX" dirty="0"/>
+              <a:t>fragmento de inicio, </a:t>
+            </a:r>
+          </a:p>
+          <a:p>
+            <a:r>
+              <a:rPr lang="es-MX" dirty="0"/>
+              <a:t>publicación y favoritos.</a:t>
+            </a:r>
+          </a:p>
+        </p:txBody>
+      </p:sp>
+    </p:spTree>
+    <p:extLst>
+      <p:ext uri="{BB962C8B-B14F-4D97-AF65-F5344CB8AC3E}">
+        <p14:creationId xmlns:p14="http://schemas.microsoft.com/office/powerpoint/2010/main" val="903152367"/>
+      </p:ext>
+    </p:extLst>
+  </p:cSld>
+  <p:clrMapOvr>
+    <a:masterClrMapping/>
+  </p:clrMapOvr>
+</p:sld>
+</file>
+
+<file path=ppt/slides/slide7.xml><?xml version="1.0" encoding="utf-8"?>
+<p:sld xmlns:a="http://schemas.openxmlformats.org/drawingml/2006/main" xmlns:r="http://schemas.openxmlformats.org/officeDocument/2006/relationships" xmlns:p="http://schemas.openxmlformats.org/presentationml/2006/main">
+  <p:cSld>
+    <p:spTree>
+      <p:nvGrpSpPr>
+        <p:cNvPr id="1" name=""/>
+        <p:cNvGrpSpPr/>
+        <p:nvPr/>
+      </p:nvGrpSpPr>
+      <p:grpSpPr>
+        <a:xfrm>
+          <a:off x="0" y="0"/>
+          <a:ext cx="0" cy="0"/>
+          <a:chOff x="0" y="0"/>
+          <a:chExt cx="0" cy="0"/>
+        </a:xfrm>
+      </p:grpSpPr>
+      <p:sp>
+        <p:nvSpPr>
+          <p:cNvPr id="2" name="Título 1">
+            <a:extLst>
+              <a:ext uri="{FF2B5EF4-FFF2-40B4-BE49-F238E27FC236}">
+                <a16:creationId xmlns:a16="http://schemas.microsoft.com/office/drawing/2014/main" id="{4DA5F721-3DC5-4B78-9AE9-321005E18D10}"/>
+              </a:ext>
+            </a:extLst>
+          </p:cNvPr>
+          <p:cNvSpPr>
+            <a:spLocks noGrp="1"/>
+          </p:cNvSpPr>
+          <p:nvPr>
+            <p:ph type="title"/>
+          </p:nvPr>
+        </p:nvSpPr>
+        <p:spPr/>
+        <p:txBody>
+          <a:bodyPr/>
+          <a:lstStyle/>
+          <a:p>
+            <a:r>
+              <a:rPr lang="es-MX" dirty="0"/>
+              <a:t>Fragmento Reporta</a:t>
+            </a:r>
+            <a:endParaRPr lang="es-CL" dirty="0"/>
+          </a:p>
+        </p:txBody>
+      </p:sp>
+      <p:sp>
+        <p:nvSpPr>
+          <p:cNvPr id="8" name="CuadroTexto 7">
+            <a:extLst>
+              <a:ext uri="{FF2B5EF4-FFF2-40B4-BE49-F238E27FC236}">
+                <a16:creationId xmlns:a16="http://schemas.microsoft.com/office/drawing/2014/main" id="{11B120FC-47F7-4B85-BB93-3868C7DF87D0}"/>
+              </a:ext>
+            </a:extLst>
+          </p:cNvPr>
+          <p:cNvSpPr txBox="1"/>
+          <p:nvPr/>
+        </p:nvSpPr>
+        <p:spPr>
+          <a:xfrm>
+            <a:off x="2824124" y="2103369"/>
+            <a:ext cx="1842364" cy="369332"/>
+          </a:xfrm>
+          <a:prstGeom prst="rect">
+            <a:avLst/>
+          </a:prstGeom>
+          <a:noFill/>
+        </p:spPr>
+        <p:txBody>
+          <a:bodyPr wrap="none" rtlCol="0">
+            <a:spAutoFit/>
+          </a:bodyPr>
+          <a:lstStyle/>
+          <a:p>
+            <a:r>
+              <a:rPr lang="es-MX" dirty="0"/>
+              <a:t>Crear Publicación</a:t>
+            </a:r>
+          </a:p>
+        </p:txBody>
+      </p:sp>
+      <p:pic>
+        <p:nvPicPr>
+          <p:cNvPr id="9" name="Imagen 8">
+            <a:extLst>
+              <a:ext uri="{FF2B5EF4-FFF2-40B4-BE49-F238E27FC236}">
+                <a16:creationId xmlns:a16="http://schemas.microsoft.com/office/drawing/2014/main" id="{EC79FD38-9EBD-41A2-931A-9F58BAA32846}"/>
+              </a:ext>
+            </a:extLst>
+          </p:cNvPr>
+          <p:cNvPicPr>
+            <a:picLocks noChangeAspect="1"/>
+          </p:cNvPicPr>
+          <p:nvPr/>
+        </p:nvPicPr>
+        <p:blipFill>
+          <a:blip r:embed="rId2"/>
+          <a:srcRect/>
+          <a:stretch/>
+        </p:blipFill>
+        <p:spPr>
+          <a:xfrm>
+            <a:off x="687291" y="2205334"/>
+            <a:ext cx="2122251" cy="4480307"/>
+          </a:xfrm>
+          <a:prstGeom prst="rect">
+            <a:avLst/>
+          </a:prstGeom>
+        </p:spPr>
+      </p:pic>
+      <p:pic>
+        <p:nvPicPr>
+          <p:cNvPr id="12" name="Imagen 11">
+            <a:extLst>
+              <a:ext uri="{FF2B5EF4-FFF2-40B4-BE49-F238E27FC236}">
+                <a16:creationId xmlns:a16="http://schemas.microsoft.com/office/drawing/2014/main" id="{CA815CB5-1828-47D5-93EB-452E90019D86}"/>
+              </a:ext>
+            </a:extLst>
+          </p:cNvPr>
+          <p:cNvPicPr>
+            <a:picLocks noChangeAspect="1"/>
+          </p:cNvPicPr>
+          <p:nvPr/>
+        </p:nvPicPr>
+        <p:blipFill>
+          <a:blip r:embed="rId3"/>
+          <a:srcRect/>
+          <a:stretch/>
+        </p:blipFill>
+        <p:spPr>
+          <a:xfrm>
+            <a:off x="6389745" y="2196004"/>
+            <a:ext cx="2122251" cy="4480307"/>
+          </a:xfrm>
+          <a:prstGeom prst="rect">
+            <a:avLst/>
+          </a:prstGeom>
+        </p:spPr>
+      </p:pic>
+      <p:sp>
+        <p:nvSpPr>
+          <p:cNvPr id="17" name="CuadroTexto 16">
+            <a:extLst>
+              <a:ext uri="{FF2B5EF4-FFF2-40B4-BE49-F238E27FC236}">
+                <a16:creationId xmlns:a16="http://schemas.microsoft.com/office/drawing/2014/main" id="{0C77E972-EC2E-44CB-8586-48283A6F4AAB}"/>
+              </a:ext>
+            </a:extLst>
+          </p:cNvPr>
+          <p:cNvSpPr txBox="1"/>
+          <p:nvPr/>
+        </p:nvSpPr>
+        <p:spPr>
+          <a:xfrm>
+            <a:off x="6567455" y="1836001"/>
+            <a:ext cx="1766830" cy="369332"/>
+          </a:xfrm>
+          <a:prstGeom prst="rect">
+            <a:avLst/>
+          </a:prstGeom>
+          <a:noFill/>
+        </p:spPr>
+        <p:txBody>
+          <a:bodyPr wrap="none" rtlCol="0">
+            <a:spAutoFit/>
+          </a:bodyPr>
+          <a:lstStyle/>
+          <a:p>
+            <a:r>
+              <a:rPr lang="es-MX" dirty="0"/>
+              <a:t>Subiendo normal</a:t>
+            </a:r>
+          </a:p>
+        </p:txBody>
+      </p:sp>
+      <p:sp>
+        <p:nvSpPr>
+          <p:cNvPr id="19" name="CuadroTexto 18">
+            <a:extLst>
+              <a:ext uri="{FF2B5EF4-FFF2-40B4-BE49-F238E27FC236}">
+                <a16:creationId xmlns:a16="http://schemas.microsoft.com/office/drawing/2014/main" id="{EFCCD98E-F07E-4748-B1CA-D444220DCA09}"/>
+              </a:ext>
+            </a:extLst>
+          </p:cNvPr>
+          <p:cNvSpPr txBox="1"/>
+          <p:nvPr/>
+        </p:nvSpPr>
+        <p:spPr>
+          <a:xfrm>
+            <a:off x="2809542" y="2610683"/>
+            <a:ext cx="2653290" cy="4247317"/>
+          </a:xfrm>
+          <a:prstGeom prst="rect">
+            <a:avLst/>
+          </a:prstGeom>
+          <a:noFill/>
+        </p:spPr>
+        <p:txBody>
+          <a:bodyPr wrap="none" rtlCol="0">
+            <a:spAutoFit/>
+          </a:bodyPr>
+          <a:lstStyle/>
+          <a:p>
+            <a:r>
+              <a:rPr lang="es-MX" dirty="0"/>
+              <a:t>Este fragmento sirve</a:t>
+            </a:r>
+          </a:p>
+          <a:p>
+            <a:r>
+              <a:rPr lang="es-MX" dirty="0"/>
+              <a:t>para publicar </a:t>
+            </a:r>
+          </a:p>
+          <a:p>
+            <a:r>
+              <a:rPr lang="es-MX" dirty="0"/>
+              <a:t>avistamientos de </a:t>
+            </a:r>
+          </a:p>
+          <a:p>
+            <a:r>
+              <a:rPr lang="es-MX" dirty="0"/>
+              <a:t>perritos que necesiten</a:t>
+            </a:r>
+          </a:p>
+          <a:p>
+            <a:r>
+              <a:rPr lang="es-MX" dirty="0"/>
+              <a:t>ayuda.</a:t>
+            </a:r>
+          </a:p>
+          <a:p>
+            <a:endParaRPr lang="es-MX" dirty="0"/>
+          </a:p>
+          <a:p>
+            <a:r>
+              <a:rPr lang="es-MX" dirty="0"/>
+              <a:t>No es requisito subir</a:t>
+            </a:r>
+          </a:p>
+          <a:p>
+            <a:r>
+              <a:rPr lang="es-MX" dirty="0"/>
+              <a:t>foto, pero si es </a:t>
+            </a:r>
+          </a:p>
+          <a:p>
+            <a:r>
+              <a:rPr lang="es-MX" dirty="0"/>
+              <a:t>requisito que tenga </a:t>
+            </a:r>
+          </a:p>
+          <a:p>
+            <a:r>
+              <a:rPr lang="es-MX" dirty="0"/>
+              <a:t>un titulo y una </a:t>
+            </a:r>
+          </a:p>
+          <a:p>
+            <a:r>
+              <a:rPr lang="es-MX" dirty="0"/>
+              <a:t>descripción.</a:t>
+            </a:r>
+          </a:p>
+          <a:p>
+            <a:endParaRPr lang="es-MX" dirty="0"/>
+          </a:p>
+          <a:p>
+            <a:r>
+              <a:rPr lang="es-MX" dirty="0"/>
+              <a:t>También se puede acceder</a:t>
+            </a:r>
+          </a:p>
+          <a:p>
+            <a:r>
+              <a:rPr lang="es-MX" dirty="0"/>
+              <a:t>a este fragmento desde el</a:t>
+            </a:r>
+          </a:p>
+          <a:p>
+            <a:r>
+              <a:rPr lang="es-MX" dirty="0"/>
+              <a:t>botón “+” en el inicio.</a:t>
+            </a:r>
+          </a:p>
+        </p:txBody>
+      </p:sp>
+      <p:pic>
+        <p:nvPicPr>
+          <p:cNvPr id="3" name="Imagen 2">
+            <a:extLst>
+              <a:ext uri="{FF2B5EF4-FFF2-40B4-BE49-F238E27FC236}">
+                <a16:creationId xmlns:a16="http://schemas.microsoft.com/office/drawing/2014/main" id="{151C74BA-8673-490A-833D-1AF3568DA12D}"/>
+              </a:ext>
+            </a:extLst>
+          </p:cNvPr>
+          <p:cNvPicPr>
+            <a:picLocks noChangeAspect="1"/>
+          </p:cNvPicPr>
+          <p:nvPr/>
+        </p:nvPicPr>
+        <p:blipFill>
+          <a:blip r:embed="rId4"/>
+          <a:srcRect/>
+          <a:stretch/>
+        </p:blipFill>
+        <p:spPr>
+          <a:xfrm>
+            <a:off x="9264766" y="2205333"/>
+            <a:ext cx="2122250" cy="4480307"/>
+          </a:xfrm>
+          <a:prstGeom prst="rect">
+            <a:avLst/>
+          </a:prstGeom>
+        </p:spPr>
+      </p:pic>
+      <p:sp>
+        <p:nvSpPr>
+          <p:cNvPr id="4" name="CuadroTexto 3">
+            <a:extLst>
+              <a:ext uri="{FF2B5EF4-FFF2-40B4-BE49-F238E27FC236}">
+                <a16:creationId xmlns:a16="http://schemas.microsoft.com/office/drawing/2014/main" id="{011A2847-709B-4537-8F9F-87AA888EBE5C}"/>
+              </a:ext>
+            </a:extLst>
+          </p:cNvPr>
+          <p:cNvSpPr txBox="1"/>
+          <p:nvPr/>
+        </p:nvSpPr>
+        <p:spPr>
+          <a:xfrm>
+            <a:off x="9169484" y="1780709"/>
+            <a:ext cx="2312813" cy="369332"/>
+          </a:xfrm>
+          <a:prstGeom prst="rect">
+            <a:avLst/>
+          </a:prstGeom>
+          <a:noFill/>
+        </p:spPr>
+        <p:txBody>
+          <a:bodyPr wrap="none" rtlCol="0">
+            <a:spAutoFit/>
+          </a:bodyPr>
+          <a:lstStyle/>
+          <a:p>
+            <a:r>
+              <a:rPr lang="es-MX" dirty="0"/>
+              <a:t>Error falta información</a:t>
+            </a:r>
+          </a:p>
+        </p:txBody>
+      </p:sp>
+    </p:spTree>
+    <p:extLst>
+      <p:ext uri="{BB962C8B-B14F-4D97-AF65-F5344CB8AC3E}">
+        <p14:creationId xmlns:p14="http://schemas.microsoft.com/office/powerpoint/2010/main" val="3489660457"/>
+      </p:ext>
+    </p:extLst>
+  </p:cSld>
+  <p:clrMapOvr>
+    <a:masterClrMapping/>
+  </p:clrMapOvr>
+</p:sld>
+</file>
+
+<file path=ppt/slides/slide8.xml><?xml version="1.0" encoding="utf-8"?>
+<p:sld xmlns:a="http://schemas.openxmlformats.org/drawingml/2006/main" xmlns:r="http://schemas.openxmlformats.org/officeDocument/2006/relationships" xmlns:p="http://schemas.openxmlformats.org/presentationml/2006/main">
+  <p:cSld>
+    <p:spTree>
+      <p:nvGrpSpPr>
+        <p:cNvPr id="1" name=""/>
+        <p:cNvGrpSpPr/>
+        <p:nvPr/>
+      </p:nvGrpSpPr>
+      <p:grpSpPr>
+        <a:xfrm>
+          <a:off x="0" y="0"/>
+          <a:ext cx="0" cy="0"/>
+          <a:chOff x="0" y="0"/>
+          <a:chExt cx="0" cy="0"/>
+        </a:xfrm>
+      </p:grpSpPr>
+      <p:sp>
+        <p:nvSpPr>
+          <p:cNvPr id="2" name="Título 1">
+            <a:extLst>
+              <a:ext uri="{FF2B5EF4-FFF2-40B4-BE49-F238E27FC236}">
+                <a16:creationId xmlns:a16="http://schemas.microsoft.com/office/drawing/2014/main" id="{4DA5F721-3DC5-4B78-9AE9-321005E18D10}"/>
+              </a:ext>
+            </a:extLst>
+          </p:cNvPr>
+          <p:cNvSpPr>
+            <a:spLocks noGrp="1"/>
+          </p:cNvSpPr>
+          <p:nvPr>
+            <p:ph type="title"/>
+          </p:nvPr>
+        </p:nvSpPr>
+        <p:spPr/>
+        <p:txBody>
+          <a:bodyPr/>
+          <a:lstStyle/>
+          <a:p>
+            <a:r>
+              <a:rPr lang="es-MX" dirty="0"/>
+              <a:t>Fragmento Favoritos</a:t>
+            </a:r>
+            <a:endParaRPr lang="es-CL" dirty="0"/>
+          </a:p>
+        </p:txBody>
+      </p:sp>
+      <p:sp>
+        <p:nvSpPr>
+          <p:cNvPr id="8" name="CuadroTexto 7">
+            <a:extLst>
+              <a:ext uri="{FF2B5EF4-FFF2-40B4-BE49-F238E27FC236}">
+                <a16:creationId xmlns:a16="http://schemas.microsoft.com/office/drawing/2014/main" id="{11B120FC-47F7-4B85-BB93-3868C7DF87D0}"/>
+              </a:ext>
+            </a:extLst>
+          </p:cNvPr>
+          <p:cNvSpPr txBox="1"/>
+          <p:nvPr/>
+        </p:nvSpPr>
+        <p:spPr>
+          <a:xfrm>
+            <a:off x="6255027" y="1868312"/>
+            <a:ext cx="1040734" cy="369332"/>
+          </a:xfrm>
+          <a:prstGeom prst="rect">
+            <a:avLst/>
+          </a:prstGeom>
+          <a:noFill/>
+        </p:spPr>
+        <p:txBody>
+          <a:bodyPr wrap="none" rtlCol="0">
+            <a:spAutoFit/>
+          </a:bodyPr>
+          <a:lstStyle/>
+          <a:p>
+            <a:r>
+              <a:rPr lang="es-MX" dirty="0"/>
+              <a:t>Favoritos</a:t>
+            </a:r>
+          </a:p>
+        </p:txBody>
+      </p:sp>
+      <p:pic>
+        <p:nvPicPr>
+          <p:cNvPr id="9" name="Imagen 8">
+            <a:extLst>
+              <a:ext uri="{FF2B5EF4-FFF2-40B4-BE49-F238E27FC236}">
+                <a16:creationId xmlns:a16="http://schemas.microsoft.com/office/drawing/2014/main" id="{EC79FD38-9EBD-41A2-931A-9F58BAA32846}"/>
+              </a:ext>
+            </a:extLst>
+          </p:cNvPr>
+          <p:cNvPicPr>
+            <a:picLocks noChangeAspect="1"/>
+          </p:cNvPicPr>
+          <p:nvPr/>
+        </p:nvPicPr>
+        <p:blipFill>
+          <a:blip r:embed="rId2"/>
+          <a:srcRect/>
+          <a:stretch/>
+        </p:blipFill>
+        <p:spPr>
+          <a:xfrm>
+            <a:off x="2314300" y="2052978"/>
+            <a:ext cx="2122251" cy="4480307"/>
+          </a:xfrm>
+          <a:prstGeom prst="rect">
+            <a:avLst/>
+          </a:prstGeom>
+        </p:spPr>
+      </p:pic>
+      <p:sp>
+        <p:nvSpPr>
+          <p:cNvPr id="19" name="CuadroTexto 18">
+            <a:extLst>
+              <a:ext uri="{FF2B5EF4-FFF2-40B4-BE49-F238E27FC236}">
+                <a16:creationId xmlns:a16="http://schemas.microsoft.com/office/drawing/2014/main" id="{EFCCD98E-F07E-4748-B1CA-D444220DCA09}"/>
+              </a:ext>
+            </a:extLst>
+          </p:cNvPr>
+          <p:cNvSpPr txBox="1"/>
+          <p:nvPr/>
+        </p:nvSpPr>
+        <p:spPr>
+          <a:xfrm>
+            <a:off x="5380383" y="2390000"/>
+            <a:ext cx="5844208" cy="3970318"/>
+          </a:xfrm>
+          <a:prstGeom prst="rect">
+            <a:avLst/>
+          </a:prstGeom>
+          <a:noFill/>
+        </p:spPr>
+        <p:txBody>
+          <a:bodyPr wrap="square" rtlCol="0">
+            <a:spAutoFit/>
+          </a:bodyPr>
+          <a:lstStyle/>
+          <a:p>
+            <a:r>
+              <a:rPr lang="es-MX" dirty="0"/>
+              <a:t>En este fragmento quedan guardados las publicaciones que agregamos a presionando el botón agregar a favorito, cuando estamos dentro de alguna publicación.</a:t>
+            </a:r>
+          </a:p>
+          <a:p>
+            <a:endParaRPr lang="es-MX" dirty="0"/>
+          </a:p>
+          <a:p>
+            <a:r>
+              <a:rPr lang="es-MX" dirty="0"/>
+              <a:t>A diferencia del </a:t>
+            </a:r>
+            <a:r>
+              <a:rPr lang="es-MX" dirty="0" err="1"/>
+              <a:t>RecylerView</a:t>
+            </a:r>
+            <a:r>
+              <a:rPr lang="es-MX" dirty="0"/>
+              <a:t> del inicio de las publicaciones, esta solo muestra la foto (si la tiene o sino carga la imagen</a:t>
+            </a:r>
+          </a:p>
+          <a:p>
+            <a:r>
+              <a:rPr lang="es-MX" dirty="0"/>
+              <a:t>predeterminada) y el titulo de la descripción, no incluye información de quien informo, ni la foto de perfil de esa persona. Si se puede presionar en la imagen y accederemos a toda la información de la publicación.</a:t>
+            </a:r>
+          </a:p>
+          <a:p>
+            <a:endParaRPr lang="es-MX" dirty="0"/>
+          </a:p>
+          <a:p>
+            <a:r>
+              <a:rPr lang="es-MX" dirty="0"/>
+              <a:t>Los </a:t>
+            </a:r>
+            <a:r>
+              <a:rPr lang="es-MX" dirty="0" err="1"/>
+              <a:t>checkBox</a:t>
+            </a:r>
+            <a:r>
+              <a:rPr lang="es-MX" dirty="0"/>
+              <a:t> sirven para eliminar de los favoritos algunas</a:t>
+            </a:r>
+          </a:p>
+          <a:p>
+            <a:r>
+              <a:rPr lang="es-MX" dirty="0"/>
+              <a:t>publicaciones que ya atendimos o simplemente no queremos</a:t>
+            </a:r>
+          </a:p>
+          <a:p>
+            <a:r>
+              <a:rPr lang="es-MX" dirty="0"/>
+              <a:t>seguir viendo.</a:t>
+            </a:r>
+          </a:p>
+        </p:txBody>
+      </p:sp>
+    </p:spTree>
+    <p:extLst>
+      <p:ext uri="{BB962C8B-B14F-4D97-AF65-F5344CB8AC3E}">
+        <p14:creationId xmlns:p14="http://schemas.microsoft.com/office/powerpoint/2010/main" val="1678153701"/>
+      </p:ext>
+    </p:extLst>
+  </p:cSld>
+  <p:clrMapOvr>
+    <a:masterClrMapping/>
+  </p:clrMapOvr>
+</p:sld>
+</file>
+
+<file path=ppt/slides/slide9.xml><?xml version="1.0" encoding="utf-8"?>
+<p:sld xmlns:a="http://schemas.openxmlformats.org/drawingml/2006/main" xmlns:r="http://schemas.openxmlformats.org/officeDocument/2006/relationships" xmlns:p="http://schemas.openxmlformats.org/presentationml/2006/main">
+  <p:cSld>
+    <p:spTree>
+      <p:nvGrpSpPr>
+        <p:cNvPr id="1" name=""/>
+        <p:cNvGrpSpPr/>
+        <p:nvPr/>
+      </p:nvGrpSpPr>
+      <p:grpSpPr>
+        <a:xfrm>
+          <a:off x="0" y="0"/>
+          <a:ext cx="0" cy="0"/>
+          <a:chOff x="0" y="0"/>
+          <a:chExt cx="0" cy="0"/>
+        </a:xfrm>
+      </p:grpSpPr>
+      <p:sp>
+        <p:nvSpPr>
+          <p:cNvPr id="2" name="Título 1">
+            <a:extLst>
+              <a:ext uri="{FF2B5EF4-FFF2-40B4-BE49-F238E27FC236}">
+                <a16:creationId xmlns:a16="http://schemas.microsoft.com/office/drawing/2014/main" id="{4DA5F721-3DC5-4B78-9AE9-321005E18D10}"/>
+              </a:ext>
+            </a:extLst>
+          </p:cNvPr>
+          <p:cNvSpPr>
+            <a:spLocks noGrp="1"/>
+          </p:cNvSpPr>
+          <p:nvPr>
+            <p:ph type="title"/>
+          </p:nvPr>
+        </p:nvSpPr>
+        <p:spPr/>
+        <p:txBody>
+          <a:bodyPr/>
+          <a:lstStyle/>
+          <a:p>
+            <a:r>
+              <a:rPr lang="es-MX" dirty="0"/>
+              <a:t>Fragmento </a:t>
+            </a:r>
+            <a:r>
+              <a:rPr lang="es-MX" dirty="0" err="1"/>
+              <a:t>publicacion</a:t>
+            </a:r>
+            <a:endParaRPr lang="es-CL" dirty="0"/>
+          </a:p>
+        </p:txBody>
+      </p:sp>
+      <p:sp>
+        <p:nvSpPr>
+          <p:cNvPr id="8" name="CuadroTexto 7">
+            <a:extLst>
+              <a:ext uri="{FF2B5EF4-FFF2-40B4-BE49-F238E27FC236}">
+                <a16:creationId xmlns:a16="http://schemas.microsoft.com/office/drawing/2014/main" id="{11B120FC-47F7-4B85-BB93-3868C7DF87D0}"/>
+              </a:ext>
+            </a:extLst>
+          </p:cNvPr>
+          <p:cNvSpPr txBox="1"/>
+          <p:nvPr/>
+        </p:nvSpPr>
+        <p:spPr>
+          <a:xfrm>
+            <a:off x="6255027" y="1868312"/>
+            <a:ext cx="2467535" cy="369332"/>
+          </a:xfrm>
+          <a:prstGeom prst="rect">
+            <a:avLst/>
+          </a:prstGeom>
+          <a:noFill/>
+        </p:spPr>
+        <p:txBody>
+          <a:bodyPr wrap="none" rtlCol="0">
+            <a:spAutoFit/>
+          </a:bodyPr>
+          <a:lstStyle/>
+          <a:p>
+            <a:r>
+              <a:rPr lang="es-MX" dirty="0"/>
+              <a:t>Ingresando a Publicación</a:t>
+            </a:r>
+          </a:p>
+        </p:txBody>
+      </p:sp>
+      <p:pic>
+        <p:nvPicPr>
+          <p:cNvPr id="9" name="Imagen 8">
+            <a:extLst>
+              <a:ext uri="{FF2B5EF4-FFF2-40B4-BE49-F238E27FC236}">
+                <a16:creationId xmlns:a16="http://schemas.microsoft.com/office/drawing/2014/main" id="{EC79FD38-9EBD-41A2-931A-9F58BAA32846}"/>
+              </a:ext>
+            </a:extLst>
+          </p:cNvPr>
+          <p:cNvPicPr>
+            <a:picLocks noChangeAspect="1"/>
+          </p:cNvPicPr>
+          <p:nvPr/>
+        </p:nvPicPr>
+        <p:blipFill>
+          <a:blip r:embed="rId2"/>
+          <a:srcRect/>
+          <a:stretch/>
+        </p:blipFill>
+        <p:spPr>
+          <a:xfrm>
+            <a:off x="3215448" y="2058553"/>
+            <a:ext cx="2122250" cy="4480307"/>
+          </a:xfrm>
+          <a:prstGeom prst="rect">
+            <a:avLst/>
+          </a:prstGeom>
+        </p:spPr>
+      </p:pic>
+      <p:sp>
+        <p:nvSpPr>
+          <p:cNvPr id="19" name="CuadroTexto 18">
+            <a:extLst>
+              <a:ext uri="{FF2B5EF4-FFF2-40B4-BE49-F238E27FC236}">
+                <a16:creationId xmlns:a16="http://schemas.microsoft.com/office/drawing/2014/main" id="{EFCCD98E-F07E-4748-B1CA-D444220DCA09}"/>
+              </a:ext>
+            </a:extLst>
+          </p:cNvPr>
+          <p:cNvSpPr txBox="1"/>
+          <p:nvPr/>
+        </p:nvSpPr>
+        <p:spPr>
+          <a:xfrm>
+            <a:off x="6255027" y="2390000"/>
+            <a:ext cx="4969564" cy="3970318"/>
+          </a:xfrm>
+          <a:prstGeom prst="rect">
+            <a:avLst/>
+          </a:prstGeom>
+          <a:noFill/>
+        </p:spPr>
+        <p:txBody>
+          <a:bodyPr wrap="square" rtlCol="0">
+            <a:spAutoFit/>
+          </a:bodyPr>
+          <a:lstStyle/>
+          <a:p>
+            <a:r>
+              <a:rPr lang="es-MX" dirty="0"/>
+              <a:t>En este fragmento se puede ver en detalle</a:t>
+            </a:r>
+          </a:p>
+          <a:p>
+            <a:r>
+              <a:rPr lang="es-MX" dirty="0"/>
+              <a:t>Las necesidades que se requieren</a:t>
+            </a:r>
+          </a:p>
+          <a:p>
+            <a:r>
+              <a:rPr lang="es-MX" dirty="0"/>
+              <a:t>En la publicación como así el lugar </a:t>
+            </a:r>
+          </a:p>
+          <a:p>
+            <a:r>
+              <a:rPr lang="es-MX" dirty="0"/>
+              <a:t>Donde se solicita. Esta información</a:t>
+            </a:r>
+          </a:p>
+          <a:p>
+            <a:r>
+              <a:rPr lang="es-MX" dirty="0"/>
+              <a:t>Depende de la persona que la publica</a:t>
+            </a:r>
+          </a:p>
+          <a:p>
+            <a:r>
+              <a:rPr lang="es-MX" dirty="0"/>
+              <a:t>Por lo que en algunos casos la información</a:t>
+            </a:r>
+          </a:p>
+          <a:p>
+            <a:r>
+              <a:rPr lang="es-MX" dirty="0"/>
+              <a:t>No estará completa o tendrá errores.</a:t>
+            </a:r>
+          </a:p>
+          <a:p>
+            <a:endParaRPr lang="es-MX" dirty="0"/>
+          </a:p>
+          <a:p>
+            <a:r>
+              <a:rPr lang="es-MX" dirty="0"/>
+              <a:t>Tiene el botón añadir a favoritos donde si se </a:t>
+            </a:r>
+          </a:p>
+          <a:p>
+            <a:r>
+              <a:rPr lang="es-MX" dirty="0"/>
+              <a:t>Presiona agregará la publicación a los </a:t>
+            </a:r>
+          </a:p>
+          <a:p>
+            <a:r>
+              <a:rPr lang="es-MX" dirty="0"/>
+              <a:t>Favoritos del usuario.</a:t>
+            </a:r>
+          </a:p>
+          <a:p>
+            <a:endParaRPr lang="es-MX" dirty="0"/>
+          </a:p>
+          <a:p>
+            <a:r>
+              <a:rPr lang="es-MX" dirty="0"/>
+              <a:t>También se puede ver el nombre del informador</a:t>
+            </a:r>
+          </a:p>
+          <a:p>
+            <a:r>
+              <a:rPr lang="es-MX" dirty="0"/>
+              <a:t>Y la foto de perfil si es que la posee.</a:t>
+            </a:r>
+          </a:p>
+        </p:txBody>
+      </p:sp>
+    </p:spTree>
+    <p:extLst>
+      <p:ext uri="{BB962C8B-B14F-4D97-AF65-F5344CB8AC3E}">
+        <p14:creationId xmlns:p14="http://schemas.microsoft.com/office/powerpoint/2010/main" val="1754027317"/>
       </p:ext>
     </p:extLst>
   </p:cSld>

</xml_diff>